<commit_message>
Update OnlyOffice to version 6.2
</commit_message>
<xml_diff>
--- a/www/common/onlyoffice/v2b/sdkjs/slide/themes/src/02_basic.pptx
+++ b/www/common/onlyoffice/v2b/sdkjs/slide/themes/src/02_basic.pptx
@@ -106,7 +106,7 @@
   </p:defaultTextStyle>
   <p:extLst>
     <p:ext uri="{EFAFB233-063F-42B5-8137-9DF3F51BA10A}">
-      <p15:sldGuideLst xmlns:p15="http://schemas.microsoft.com/office/powerpoint/2012/main" xmlns="">
+      <p15:sldGuideLst xmlns="" xmlns:p15="http://schemas.microsoft.com/office/powerpoint/2012/main">
         <p15:guide id="1" orient="horz" pos="2160">
           <p15:clr>
             <a:srgbClr val="A4A3A4"/>
@@ -313,7 +313,7 @@
           <a:p>
             <a:fld id="{51E84241-D031-42DE-84E4-CC10C30232F4}" type="datetimeFigureOut">
               <a:rPr lang="ru-RU" smtClean="0"/>
-              <a:t>22.10.2013</a:t>
+              <a:t>26.12.2019</a:t>
             </a:fld>
             <a:endParaRPr lang="ru-RU"/>
           </a:p>
@@ -2503,7 +2503,7 @@
           <a:p>
             <a:fld id="{51E84241-D031-42DE-84E4-CC10C30232F4}" type="datetimeFigureOut">
               <a:rPr lang="ru-RU" smtClean="0"/>
-              <a:t>22.10.2013</a:t>
+              <a:t>26.12.2019</a:t>
             </a:fld>
             <a:endParaRPr lang="ru-RU"/>
           </a:p>
@@ -2688,7 +2688,7 @@
           <a:p>
             <a:fld id="{51E84241-D031-42DE-84E4-CC10C30232F4}" type="datetimeFigureOut">
               <a:rPr lang="ru-RU" smtClean="0"/>
-              <a:t>22.10.2013</a:t>
+              <a:t>26.12.2019</a:t>
             </a:fld>
             <a:endParaRPr lang="ru-RU"/>
           </a:p>
@@ -2842,6 +2842,87 @@
           </a:p>
         </p:txBody>
       </p:sp>
+      <p:sp>
+        <p:nvSpPr>
+          <p:cNvPr id="4" name="Дата 14"/>
+          <p:cNvSpPr>
+            <a:spLocks noGrp="1"/>
+          </p:cNvSpPr>
+          <p:nvPr>
+            <p:ph type="dt" sz="half" idx="10"/>
+          </p:nvPr>
+        </p:nvSpPr>
+        <p:spPr>
+          <a:xfrm>
+            <a:off x="455446" y="4582131"/>
+            <a:ext cx="2133600" cy="273844"/>
+          </a:xfrm>
+        </p:spPr>
+        <p:txBody>
+          <a:bodyPr/>
+          <a:lstStyle/>
+          <a:p>
+            <a:fld id="{51E84241-D031-42DE-84E4-CC10C30232F4}" type="datetimeFigureOut">
+              <a:rPr lang="ru-RU" smtClean="0"/>
+              <a:t>26.12.2019</a:t>
+            </a:fld>
+            <a:endParaRPr lang="ru-RU"/>
+          </a:p>
+        </p:txBody>
+      </p:sp>
+      <p:sp>
+        <p:nvSpPr>
+          <p:cNvPr id="5" name="Нижний колонтитул 15"/>
+          <p:cNvSpPr>
+            <a:spLocks noGrp="1"/>
+          </p:cNvSpPr>
+          <p:nvPr>
+            <p:ph type="ftr" sz="quarter" idx="11"/>
+          </p:nvPr>
+        </p:nvSpPr>
+        <p:spPr>
+          <a:xfrm>
+            <a:off x="5819164" y="4599627"/>
+            <a:ext cx="2895600" cy="273844"/>
+          </a:xfrm>
+        </p:spPr>
+        <p:txBody>
+          <a:bodyPr/>
+          <a:lstStyle/>
+          <a:p>
+            <a:endParaRPr lang="ru-RU"/>
+          </a:p>
+        </p:txBody>
+      </p:sp>
+      <p:sp>
+        <p:nvSpPr>
+          <p:cNvPr id="6" name="Номер слайда 17"/>
+          <p:cNvSpPr>
+            <a:spLocks noGrp="1"/>
+          </p:cNvSpPr>
+          <p:nvPr>
+            <p:ph type="sldNum" sz="quarter" idx="12"/>
+          </p:nvPr>
+        </p:nvSpPr>
+        <p:spPr>
+          <a:xfrm>
+            <a:off x="3892797" y="4599627"/>
+            <a:ext cx="714476" cy="273844"/>
+          </a:xfrm>
+        </p:spPr>
+        <p:txBody>
+          <a:bodyPr/>
+          <a:lstStyle/>
+          <a:p>
+            <a:fld id="{91974DF9-AD47-4691-BA21-BBFCE3637A9A}" type="slidenum">
+              <a:rPr lang="en-US" smtClean="0"/>
+              <a:pPr/>
+              <a:t>‹#›</a:t>
+            </a:fld>
+            <a:endParaRPr lang="en-US" dirty="0"/>
+          </a:p>
+        </p:txBody>
+      </p:sp>
     </p:spTree>
     <p:extLst>
       <p:ext uri="{BB962C8B-B14F-4D97-AF65-F5344CB8AC3E}">
@@ -3041,7 +3122,7 @@
           <a:p>
             <a:fld id="{51E84241-D031-42DE-84E4-CC10C30232F4}" type="datetimeFigureOut">
               <a:rPr lang="ru-RU" smtClean="0"/>
-              <a:t>22.10.2013</a:t>
+              <a:t>26.12.2019</a:t>
             </a:fld>
             <a:endParaRPr lang="ru-RU"/>
           </a:p>
@@ -3307,7 +3388,7 @@
           <a:p>
             <a:fld id="{51E84241-D031-42DE-84E4-CC10C30232F4}" type="datetimeFigureOut">
               <a:rPr lang="ru-RU" smtClean="0"/>
-              <a:t>22.10.2013</a:t>
+              <a:t>26.12.2019</a:t>
             </a:fld>
             <a:endParaRPr lang="ru-RU"/>
           </a:p>
@@ -3726,7 +3807,7 @@
           <a:p>
             <a:fld id="{51E84241-D031-42DE-84E4-CC10C30232F4}" type="datetimeFigureOut">
               <a:rPr lang="ru-RU" smtClean="0"/>
-              <a:t>22.10.2013</a:t>
+              <a:t>26.12.2019</a:t>
             </a:fld>
             <a:endParaRPr lang="ru-RU"/>
           </a:p>
@@ -3868,7 +3949,7 @@
           <a:p>
             <a:fld id="{51E84241-D031-42DE-84E4-CC10C30232F4}" type="datetimeFigureOut">
               <a:rPr lang="ru-RU" smtClean="0"/>
-              <a:t>22.10.2013</a:t>
+              <a:t>26.12.2019</a:t>
             </a:fld>
             <a:endParaRPr lang="ru-RU"/>
           </a:p>
@@ -3964,7 +4045,7 @@
           <a:p>
             <a:fld id="{51E84241-D031-42DE-84E4-CC10C30232F4}" type="datetimeFigureOut">
               <a:rPr lang="ru-RU" smtClean="0"/>
-              <a:t>22.10.2013</a:t>
+              <a:t>26.12.2019</a:t>
             </a:fld>
             <a:endParaRPr lang="ru-RU" dirty="0"/>
           </a:p>
@@ -4220,7 +4301,7 @@
           <a:p>
             <a:fld id="{51E84241-D031-42DE-84E4-CC10C30232F4}" type="datetimeFigureOut">
               <a:rPr lang="ru-RU" smtClean="0"/>
-              <a:t>22.10.2013</a:t>
+              <a:t>26.12.2019</a:t>
             </a:fld>
             <a:endParaRPr lang="ru-RU"/>
           </a:p>
@@ -4500,7 +4581,7 @@
           <a:p>
             <a:fld id="{51E84241-D031-42DE-84E4-CC10C30232F4}" type="datetimeFigureOut">
               <a:rPr lang="ru-RU" smtClean="0"/>
-              <a:t>22.10.2013</a:t>
+              <a:t>26.12.2019</a:t>
             </a:fld>
             <a:endParaRPr lang="ru-RU"/>
           </a:p>
@@ -8839,7 +8920,7 @@
           <a:p>
             <a:fld id="{51E84241-D031-42DE-84E4-CC10C30232F4}" type="datetimeFigureOut">
               <a:rPr lang="ru-RU" smtClean="0"/>
-              <a:t>22.10.2013</a:t>
+              <a:t>26.12.2019</a:t>
             </a:fld>
             <a:endParaRPr lang="ru-RU" dirty="0"/>
           </a:p>
@@ -9531,48 +9612,6 @@
     </a:fmtScheme>
   </a:themeElements>
   <a:objectDefaults/>
-  <a:extraClrSchemeLst>
-    <a:extraClrScheme>
-      <a:clrScheme name="Custom">
-        <a:dk1>
-          <a:srgbClr val="0F243E"/>
-        </a:dk1>
-        <a:lt1>
-          <a:sysClr val="window" lastClr="FFFFFF"/>
-        </a:lt1>
-        <a:dk2>
-          <a:srgbClr val="1F497D"/>
-        </a:dk2>
-        <a:lt2>
-          <a:srgbClr val="EEECE1"/>
-        </a:lt2>
-        <a:accent1>
-          <a:srgbClr val="0000FF"/>
-        </a:accent1>
-        <a:accent2>
-          <a:srgbClr val="FE19FF"/>
-        </a:accent2>
-        <a:accent3>
-          <a:srgbClr val="00B050"/>
-        </a:accent3>
-        <a:accent4>
-          <a:srgbClr val="FF0000"/>
-        </a:accent4>
-        <a:accent5>
-          <a:srgbClr val="4BACC6"/>
-        </a:accent5>
-        <a:accent6>
-          <a:srgbClr val="FFFF00"/>
-        </a:accent6>
-        <a:hlink>
-          <a:srgbClr val="548DD4"/>
-        </a:hlink>
-        <a:folHlink>
-          <a:srgbClr val="FE19FF"/>
-        </a:folHlink>
-      </a:clrScheme>
-      <a:clrMap bg1="lt1" tx1="dk1" bg2="lt2" tx2="dk2" accent1="accent1" accent2="accent2" accent3="accent3" accent4="accent4" accent5="accent5" accent6="accent6" hlink="hlink" folHlink="folHlink"/>
-    </a:extraClrScheme>
-  </a:extraClrSchemeLst>
+  <a:extraClrSchemeLst/>
 </a:theme>
 </file>
</xml_diff>